<commit_message>
Transfer demo assets for July 2024 delivery
</commit_message>
<xml_diff>
--- a/warner-github-aio.pptx
+++ b/warner-github-aio.pptx
@@ -195,6 +195,106 @@
     </a:lvl9pPr>
   </p:defaultTextStyle>
   <p:extLst>
+    <p:ext uri="{521415D9-36F7-43E2-AB2F-B90AF26B5E84}">
+      <p14:sectionLst xmlns:p14="http://schemas.microsoft.com/office/powerpoint/2010/main">
+        <p14:section name="Go Time" id="{E602D9E9-9F57-49C2-88CE-B87157358394}">
+          <p14:sldIdLst>
+            <p14:sldId id="264"/>
+          </p14:sldIdLst>
+        </p14:section>
+        <p14:section name="Under Construction" id="{1E61F531-83FC-448D-B952-D63552D6E8CE}">
+          <p14:sldIdLst>
+            <p14:sldId id="281"/>
+            <p14:sldId id="303"/>
+            <p14:sldId id="313"/>
+            <p14:sldId id="2134805746"/>
+            <p14:sldId id="2134805752"/>
+            <p14:sldId id="2134805753"/>
+            <p14:sldId id="282"/>
+            <p14:sldId id="288"/>
+            <p14:sldId id="289"/>
+            <p14:sldId id="292"/>
+            <p14:sldId id="283"/>
+            <p14:sldId id="284"/>
+            <p14:sldId id="290"/>
+            <p14:sldId id="293"/>
+            <p14:sldId id="285"/>
+            <p14:sldId id="286"/>
+            <p14:sldId id="2134805754"/>
+            <p14:sldId id="2134805755"/>
+            <p14:sldId id="300"/>
+            <p14:sldId id="2134805756"/>
+            <p14:sldId id="2134805757"/>
+            <p14:sldId id="308"/>
+            <p14:sldId id="302"/>
+            <p14:sldId id="2134805759"/>
+            <p14:sldId id="2134805760"/>
+            <p14:sldId id="2134805761"/>
+            <p14:sldId id="2134805762"/>
+            <p14:sldId id="2134805763"/>
+            <p14:sldId id="299"/>
+            <p14:sldId id="2134805764"/>
+            <p14:sldId id="2134805765"/>
+            <p14:sldId id="2134805766"/>
+            <p14:sldId id="2134805768"/>
+            <p14:sldId id="2134805769"/>
+            <p14:sldId id="2134805770"/>
+            <p14:sldId id="2134805771"/>
+            <p14:sldId id="2134805772"/>
+            <p14:sldId id="298"/>
+            <p14:sldId id="2134805773"/>
+            <p14:sldId id="2134805774"/>
+            <p14:sldId id="2134805775"/>
+            <p14:sldId id="2134805776"/>
+            <p14:sldId id="2134805777"/>
+            <p14:sldId id="2134805778"/>
+            <p14:sldId id="2134805779"/>
+            <p14:sldId id="2134805743"/>
+            <p14:sldId id="2134805780"/>
+            <p14:sldId id="2134805781"/>
+            <p14:sldId id="2134805744"/>
+            <p14:sldId id="2134805784"/>
+            <p14:sldId id="2134805785"/>
+            <p14:sldId id="2134805786"/>
+            <p14:sldId id="2134805790"/>
+            <p14:sldId id="2134805791"/>
+            <p14:sldId id="2134805792"/>
+            <p14:sldId id="2134805793"/>
+            <p14:sldId id="2134805794"/>
+            <p14:sldId id="2134805795"/>
+            <p14:sldId id="2134805787"/>
+            <p14:sldId id="2134805788"/>
+            <p14:sldId id="2134805789"/>
+            <p14:sldId id="2134805782"/>
+            <p14:sldId id="2134805783"/>
+            <p14:sldId id="297"/>
+            <p14:sldId id="2134805767"/>
+            <p14:sldId id="291"/>
+            <p14:sldId id="301"/>
+            <p14:sldId id="310"/>
+            <p14:sldId id="311"/>
+            <p14:sldId id="309"/>
+            <p14:sldId id="312"/>
+            <p14:sldId id="2134805758"/>
+            <p14:sldId id="294"/>
+            <p14:sldId id="295"/>
+            <p14:sldId id="287"/>
+            <p14:sldId id="305"/>
+            <p14:sldId id="2759"/>
+            <p14:sldId id="2134805745"/>
+            <p14:sldId id="2760"/>
+            <p14:sldId id="2782"/>
+            <p14:sldId id="2781"/>
+            <p14:sldId id="2757"/>
+            <p14:sldId id="2766"/>
+            <p14:sldId id="2134805749"/>
+            <p14:sldId id="2780"/>
+            <p14:sldId id="2134805751"/>
+            <p14:sldId id="304"/>
+          </p14:sldIdLst>
+        </p14:section>
+      </p14:sectionLst>
+    </p:ext>
     <p:ext uri="{EFAFB233-063F-42B5-8137-9DF3F51BA10A}">
       <p15:sldGuideLst xmlns:p15="http://schemas.microsoft.com/office/powerpoint/2012/main">
         <p15:guide id="1" orient="horz" pos="1620">
@@ -3381,7 +3481,7 @@
           <a:p>
             <a:fld id="{AE6EFC88-97AF-7E49-90CE-BB6B03BD3161}" type="datetimeFigureOut">
               <a:rPr lang="en-US" smtClean="0"/>
-              <a:t>Mon, 5/20/2024</a:t>
+              <a:t>Wed, 7/17/2024</a:t>
             </a:fld>
             <a:endParaRPr lang="en-US"/>
           </a:p>
@@ -9491,6 +9591,126 @@
           </a:p>
         </p:txBody>
       </p:sp>
+      <p:pic>
+        <p:nvPicPr>
+          <p:cNvPr id="4" name="Picture 3">
+            <a:extLst>
+              <a:ext uri="{FF2B5EF4-FFF2-40B4-BE49-F238E27FC236}">
+                <a16:creationId xmlns:a16="http://schemas.microsoft.com/office/drawing/2014/main" id="{9163F234-EB9D-6E5E-B61A-F1696C98AF13}"/>
+              </a:ext>
+            </a:extLst>
+          </p:cNvPr>
+          <p:cNvPicPr>
+            <a:picLocks noChangeAspect="1"/>
+          </p:cNvPicPr>
+          <p:nvPr userDrawn="1"/>
+        </p:nvPicPr>
+        <p:blipFill>
+          <a:blip r:embed="rId3"/>
+          <a:stretch>
+            <a:fillRect/>
+          </a:stretch>
+        </p:blipFill>
+        <p:spPr>
+          <a:xfrm>
+            <a:off x="156754" y="4741818"/>
+            <a:ext cx="901337" cy="281552"/>
+          </a:xfrm>
+          <a:prstGeom prst="rect">
+            <a:avLst/>
+          </a:prstGeom>
+        </p:spPr>
+      </p:pic>
+      <p:pic>
+        <p:nvPicPr>
+          <p:cNvPr id="7" name="Picture 6">
+            <a:extLst>
+              <a:ext uri="{FF2B5EF4-FFF2-40B4-BE49-F238E27FC236}">
+                <a16:creationId xmlns:a16="http://schemas.microsoft.com/office/drawing/2014/main" id="{29DC5631-3450-D07D-AE49-6F758CC4E012}"/>
+              </a:ext>
+            </a:extLst>
+          </p:cNvPr>
+          <p:cNvPicPr>
+            <a:picLocks noChangeAspect="1"/>
+          </p:cNvPicPr>
+          <p:nvPr userDrawn="1"/>
+        </p:nvPicPr>
+        <p:blipFill>
+          <a:blip r:embed="rId4"/>
+          <a:stretch>
+            <a:fillRect/>
+          </a:stretch>
+        </p:blipFill>
+        <p:spPr>
+          <a:xfrm>
+            <a:off x="978265" y="953484"/>
+            <a:ext cx="771429" cy="1746853"/>
+          </a:xfrm>
+          <a:prstGeom prst="rect">
+            <a:avLst/>
+          </a:prstGeom>
+        </p:spPr>
+      </p:pic>
+      <p:pic>
+        <p:nvPicPr>
+          <p:cNvPr id="9" name="Picture 8">
+            <a:extLst>
+              <a:ext uri="{FF2B5EF4-FFF2-40B4-BE49-F238E27FC236}">
+                <a16:creationId xmlns:a16="http://schemas.microsoft.com/office/drawing/2014/main" id="{ED18FFDD-FEE0-99C6-E431-B3F22AD370F2}"/>
+              </a:ext>
+            </a:extLst>
+          </p:cNvPr>
+          <p:cNvPicPr>
+            <a:picLocks noChangeAspect="1"/>
+          </p:cNvPicPr>
+          <p:nvPr userDrawn="1"/>
+        </p:nvPicPr>
+        <p:blipFill>
+          <a:blip r:embed="rId4"/>
+          <a:stretch>
+            <a:fillRect/>
+          </a:stretch>
+        </p:blipFill>
+        <p:spPr>
+          <a:xfrm>
+            <a:off x="1529867" y="1226900"/>
+            <a:ext cx="1198092" cy="1173400"/>
+          </a:xfrm>
+          <a:prstGeom prst="rect">
+            <a:avLst/>
+          </a:prstGeom>
+        </p:spPr>
+      </p:pic>
+      <p:pic>
+        <p:nvPicPr>
+          <p:cNvPr id="12" name="Picture 11">
+            <a:extLst>
+              <a:ext uri="{FF2B5EF4-FFF2-40B4-BE49-F238E27FC236}">
+                <a16:creationId xmlns:a16="http://schemas.microsoft.com/office/drawing/2014/main" id="{3A603345-DB86-E0A1-9A38-3987ECAE07C0}"/>
+              </a:ext>
+            </a:extLst>
+          </p:cNvPr>
+          <p:cNvPicPr>
+            <a:picLocks noChangeAspect="1"/>
+          </p:cNvPicPr>
+          <p:nvPr userDrawn="1"/>
+        </p:nvPicPr>
+        <p:blipFill>
+          <a:blip r:embed="rId5"/>
+          <a:stretch>
+            <a:fillRect/>
+          </a:stretch>
+        </p:blipFill>
+        <p:spPr>
+          <a:xfrm>
+            <a:off x="809803" y="1053105"/>
+            <a:ext cx="1901382" cy="1537695"/>
+          </a:xfrm>
+          <a:prstGeom prst="rect">
+            <a:avLst/>
+          </a:prstGeom>
+        </p:spPr>
+      </p:pic>
     </p:spTree>
     <p:extLst>
       <p:ext uri="{BB962C8B-B14F-4D97-AF65-F5344CB8AC3E}">
@@ -9666,6 +9886,36 @@
           </a:p>
         </p:txBody>
       </p:sp>
+      <p:pic>
+        <p:nvPicPr>
+          <p:cNvPr id="4" name="Picture 3">
+            <a:extLst>
+              <a:ext uri="{FF2B5EF4-FFF2-40B4-BE49-F238E27FC236}">
+                <a16:creationId xmlns:a16="http://schemas.microsoft.com/office/drawing/2014/main" id="{791CD57F-32CF-0029-590E-9AD84A615580}"/>
+              </a:ext>
+            </a:extLst>
+          </p:cNvPr>
+          <p:cNvPicPr>
+            <a:picLocks noChangeAspect="1"/>
+          </p:cNvPicPr>
+          <p:nvPr userDrawn="1"/>
+        </p:nvPicPr>
+        <p:blipFill>
+          <a:blip r:embed="rId3"/>
+          <a:stretch>
+            <a:fillRect/>
+          </a:stretch>
+        </p:blipFill>
+        <p:spPr>
+          <a:xfrm>
+            <a:off x="156754" y="4741818"/>
+            <a:ext cx="901337" cy="281552"/>
+          </a:xfrm>
+          <a:prstGeom prst="rect">
+            <a:avLst/>
+          </a:prstGeom>
+        </p:spPr>
+      </p:pic>
     </p:spTree>
     <p:extLst>
       <p:ext uri="{BB962C8B-B14F-4D97-AF65-F5344CB8AC3E}">
@@ -9935,6 +10185,36 @@
           </a:p>
         </p:txBody>
       </p:sp>
+      <p:pic>
+        <p:nvPicPr>
+          <p:cNvPr id="5" name="Picture 4">
+            <a:extLst>
+              <a:ext uri="{FF2B5EF4-FFF2-40B4-BE49-F238E27FC236}">
+                <a16:creationId xmlns:a16="http://schemas.microsoft.com/office/drawing/2014/main" id="{493B0BC9-51E5-FD56-3CC4-18BD3946775B}"/>
+              </a:ext>
+            </a:extLst>
+          </p:cNvPr>
+          <p:cNvPicPr>
+            <a:picLocks noChangeAspect="1"/>
+          </p:cNvPicPr>
+          <p:nvPr userDrawn="1"/>
+        </p:nvPicPr>
+        <p:blipFill>
+          <a:blip r:embed="rId3"/>
+          <a:stretch>
+            <a:fillRect/>
+          </a:stretch>
+        </p:blipFill>
+        <p:spPr>
+          <a:xfrm>
+            <a:off x="156754" y="4741818"/>
+            <a:ext cx="901337" cy="281552"/>
+          </a:xfrm>
+          <a:prstGeom prst="rect">
+            <a:avLst/>
+          </a:prstGeom>
+        </p:spPr>
+      </p:pic>
     </p:spTree>
     <p:extLst>
       <p:ext uri="{BB962C8B-B14F-4D97-AF65-F5344CB8AC3E}">
@@ -10110,6 +10390,36 @@
           </a:p>
         </p:txBody>
       </p:sp>
+      <p:pic>
+        <p:nvPicPr>
+          <p:cNvPr id="3" name="Picture 2">
+            <a:extLst>
+              <a:ext uri="{FF2B5EF4-FFF2-40B4-BE49-F238E27FC236}">
+                <a16:creationId xmlns:a16="http://schemas.microsoft.com/office/drawing/2014/main" id="{11A2F564-A9E0-D4A6-DA22-A87AA4D1320E}"/>
+              </a:ext>
+            </a:extLst>
+          </p:cNvPr>
+          <p:cNvPicPr>
+            <a:picLocks noChangeAspect="1"/>
+          </p:cNvPicPr>
+          <p:nvPr userDrawn="1"/>
+        </p:nvPicPr>
+        <p:blipFill>
+          <a:blip r:embed="rId3"/>
+          <a:stretch>
+            <a:fillRect/>
+          </a:stretch>
+        </p:blipFill>
+        <p:spPr>
+          <a:xfrm>
+            <a:off x="156754" y="4741818"/>
+            <a:ext cx="901337" cy="281552"/>
+          </a:xfrm>
+          <a:prstGeom prst="rect">
+            <a:avLst/>
+          </a:prstGeom>
+        </p:spPr>
+      </p:pic>
     </p:spTree>
     <p:extLst>
       <p:ext uri="{BB962C8B-B14F-4D97-AF65-F5344CB8AC3E}">
@@ -10285,6 +10595,36 @@
           </a:p>
         </p:txBody>
       </p:sp>
+      <p:pic>
+        <p:nvPicPr>
+          <p:cNvPr id="3" name="Picture 2">
+            <a:extLst>
+              <a:ext uri="{FF2B5EF4-FFF2-40B4-BE49-F238E27FC236}">
+                <a16:creationId xmlns:a16="http://schemas.microsoft.com/office/drawing/2014/main" id="{DE0DD9FC-78CB-CC48-03AD-07414DDC5108}"/>
+              </a:ext>
+            </a:extLst>
+          </p:cNvPr>
+          <p:cNvPicPr>
+            <a:picLocks noChangeAspect="1"/>
+          </p:cNvPicPr>
+          <p:nvPr userDrawn="1"/>
+        </p:nvPicPr>
+        <p:blipFill>
+          <a:blip r:embed="rId3"/>
+          <a:stretch>
+            <a:fillRect/>
+          </a:stretch>
+        </p:blipFill>
+        <p:spPr>
+          <a:xfrm>
+            <a:off x="137159" y="4701540"/>
+            <a:ext cx="891541" cy="322534"/>
+          </a:xfrm>
+          <a:prstGeom prst="rect">
+            <a:avLst/>
+          </a:prstGeom>
+        </p:spPr>
+      </p:pic>
     </p:spTree>
     <p:extLst>
       <p:ext uri="{BB962C8B-B14F-4D97-AF65-F5344CB8AC3E}">
@@ -10460,6 +10800,36 @@
           </a:p>
         </p:txBody>
       </p:sp>
+      <p:pic>
+        <p:nvPicPr>
+          <p:cNvPr id="7" name="Picture 6">
+            <a:extLst>
+              <a:ext uri="{FF2B5EF4-FFF2-40B4-BE49-F238E27FC236}">
+                <a16:creationId xmlns:a16="http://schemas.microsoft.com/office/drawing/2014/main" id="{E81BFFD2-2A5F-1053-0E42-A89EDB7FA528}"/>
+              </a:ext>
+            </a:extLst>
+          </p:cNvPr>
+          <p:cNvPicPr>
+            <a:picLocks noChangeAspect="1"/>
+          </p:cNvPicPr>
+          <p:nvPr userDrawn="1"/>
+        </p:nvPicPr>
+        <p:blipFill>
+          <a:blip r:embed="rId3"/>
+          <a:stretch>
+            <a:fillRect/>
+          </a:stretch>
+        </p:blipFill>
+        <p:spPr>
+          <a:xfrm>
+            <a:off x="137159" y="4701540"/>
+            <a:ext cx="891541" cy="322534"/>
+          </a:xfrm>
+          <a:prstGeom prst="rect">
+            <a:avLst/>
+          </a:prstGeom>
+        </p:spPr>
+      </p:pic>
     </p:spTree>
     <p:extLst>
       <p:ext uri="{BB962C8B-B14F-4D97-AF65-F5344CB8AC3E}">
@@ -10662,7 +11032,7 @@
             <a:fld id="{128B0A6C-EF38-9441-ADBF-8FE45FA6C46E}" type="datetimeFigureOut">
               <a:rPr lang="en-US" smtClean="0"/>
               <a:pPr/>
-              <a:t>Mon, 5/20/2024</a:t>
+              <a:t>Wed, 7/17/2024</a:t>
             </a:fld>
             <a:endParaRPr lang="en-US"/>
           </a:p>
@@ -11261,8 +11631,8 @@
         </p:nvSpPr>
         <p:spPr>
           <a:xfrm>
-            <a:off x="3877317" y="233844"/>
-            <a:ext cx="5493124" cy="979714"/>
+            <a:off x="3734819" y="-38100"/>
+            <a:ext cx="5533440" cy="993314"/>
           </a:xfrm>
           <a:prstGeom prst="rect">
             <a:avLst/>
@@ -11290,12 +11660,12 @@
           </a:lstStyle>
           <a:p>
             <a:r>
-              <a:rPr lang="en-US" sz="2600" b="1" dirty="0">
+              <a:rPr lang="en-US" sz="3200" b="1" dirty="0">
                 <a:solidFill>
                   <a:schemeClr val="bg1"/>
                 </a:solidFill>
               </a:rPr>
-              <a:t>GitHub Copilot for Developers</a:t>
+              <a:t>GitHub Copilot for Almost Everyone</a:t>
             </a:r>
           </a:p>
         </p:txBody>
@@ -11324,6 +11694,66 @@
           <a:xfrm>
             <a:off x="353131" y="806450"/>
             <a:ext cx="2779727" cy="3410469"/>
+          </a:xfrm>
+          <a:prstGeom prst="rect">
+            <a:avLst/>
+          </a:prstGeom>
+        </p:spPr>
+      </p:pic>
+      <p:pic>
+        <p:nvPicPr>
+          <p:cNvPr id="3" name="Picture 2">
+            <a:extLst>
+              <a:ext uri="{FF2B5EF4-FFF2-40B4-BE49-F238E27FC236}">
+                <a16:creationId xmlns:a16="http://schemas.microsoft.com/office/drawing/2014/main" id="{4BB8DB96-E122-7455-6046-6112A98E4D79}"/>
+              </a:ext>
+            </a:extLst>
+          </p:cNvPr>
+          <p:cNvPicPr>
+            <a:picLocks noChangeAspect="1"/>
+          </p:cNvPicPr>
+          <p:nvPr/>
+        </p:nvPicPr>
+        <p:blipFill>
+          <a:blip r:embed="rId4"/>
+          <a:stretch>
+            <a:fillRect/>
+          </a:stretch>
+        </p:blipFill>
+        <p:spPr>
+          <a:xfrm>
+            <a:off x="156754" y="4741818"/>
+            <a:ext cx="901337" cy="281552"/>
+          </a:xfrm>
+          <a:prstGeom prst="rect">
+            <a:avLst/>
+          </a:prstGeom>
+        </p:spPr>
+      </p:pic>
+      <p:pic>
+        <p:nvPicPr>
+          <p:cNvPr id="7" name="Picture 6">
+            <a:extLst>
+              <a:ext uri="{FF2B5EF4-FFF2-40B4-BE49-F238E27FC236}">
+                <a16:creationId xmlns:a16="http://schemas.microsoft.com/office/drawing/2014/main" id="{2C8F613B-EFA5-BEBA-670B-878DA49A4355}"/>
+              </a:ext>
+            </a:extLst>
+          </p:cNvPr>
+          <p:cNvPicPr>
+            <a:picLocks noChangeAspect="1"/>
+          </p:cNvPicPr>
+          <p:nvPr/>
+        </p:nvPicPr>
+        <p:blipFill>
+          <a:blip r:embed="rId5"/>
+          <a:stretch>
+            <a:fillRect/>
+          </a:stretch>
+        </p:blipFill>
+        <p:spPr>
+          <a:xfrm>
+            <a:off x="4920012" y="1286687"/>
+            <a:ext cx="3163054" cy="3125127"/>
           </a:xfrm>
           <a:prstGeom prst="rect">
             <a:avLst/>
@@ -39586,6 +40016,15 @@
 </file>
 
 <file path=customXml/item1.xml><?xml version="1.0" encoding="utf-8"?>
+<?mso-contentType ?>
+<FormTemplates xmlns="http://schemas.microsoft.com/sharepoint/v3/contenttype/forms">
+  <Display>DocumentLibraryForm</Display>
+  <Edit>DocumentLibraryForm</Edit>
+  <New>DocumentLibraryForm</New>
+</FormTemplates>
+</file>
+
+<file path=customXml/item2.xml><?xml version="1.0" encoding="utf-8"?>
 <p:properties xmlns:p="http://schemas.microsoft.com/office/2006/metadata/properties" xmlns:xsi="http://www.w3.org/2001/XMLSchema-instance" xmlns:pc="http://schemas.microsoft.com/office/infopath/2007/PartnerControls">
   <documentManagement>
     <lcf76f155ced4ddcb4097134ff3c332f xmlns="1501a101-02f8-4cb9-8ad4-ac4c2bb50a5e">
@@ -39596,7 +40035,7 @@
 </p:properties>
 </file>
 
-<file path=customXml/item2.xml><?xml version="1.0" encoding="utf-8"?>
+<file path=customXml/item3.xml><?xml version="1.0" encoding="utf-8"?>
 <ct:contentTypeSchema xmlns:ct="http://schemas.microsoft.com/office/2006/metadata/contentType" xmlns:ma="http://schemas.microsoft.com/office/2006/metadata/properties/metaAttributes" ct:_="" ma:_="" ma:contentTypeName="Document" ma:contentTypeID="0x0101009EB942DAA29B6641B847DD25AB6364DF" ma:contentTypeVersion="16" ma:contentTypeDescription="Create a new document." ma:contentTypeScope="" ma:versionID="1da6bb5cfeb38e1ab2ab1c4a8f4937d6">
   <xsd:schema xmlns:xsd="http://www.w3.org/2001/XMLSchema" xmlns:xs="http://www.w3.org/2001/XMLSchema" xmlns:p="http://schemas.microsoft.com/office/2006/metadata/properties" xmlns:ns2="1501a101-02f8-4cb9-8ad4-ac4c2bb50a5e" xmlns:ns3="53af226d-ba0a-4b77-ace2-7e16defb8490" targetNamespace="http://schemas.microsoft.com/office/2006/metadata/properties" ma:root="true" ma:fieldsID="801b1b30ca996e77365ab32abcbf27d8" ns2:_="" ns3:_="">
     <xsd:import namespace="1501a101-02f8-4cb9-8ad4-ac4c2bb50a5e"/>
@@ -39839,16 +40278,15 @@
 </ct:contentTypeSchema>
 </file>
 
-<file path=customXml/item3.xml><?xml version="1.0" encoding="utf-8"?>
-<?mso-contentType ?>
-<FormTemplates xmlns="http://schemas.microsoft.com/sharepoint/v3/contenttype/forms">
-  <Display>DocumentLibraryForm</Display>
-  <Edit>DocumentLibraryForm</Edit>
-  <New>DocumentLibraryForm</New>
-</FormTemplates>
+<file path=customXml/itemProps1.xml><?xml version="1.0" encoding="utf-8"?>
+<ds:datastoreItem xmlns:ds="http://schemas.openxmlformats.org/officeDocument/2006/customXml" ds:itemID="{89D6709A-1285-445D-8507-9077DBC04879}">
+  <ds:schemaRefs>
+    <ds:schemaRef ds:uri="http://schemas.microsoft.com/sharepoint/v3/contenttype/forms"/>
+  </ds:schemaRefs>
+</ds:datastoreItem>
 </file>
 
-<file path=customXml/itemProps1.xml><?xml version="1.0" encoding="utf-8"?>
+<file path=customXml/itemProps2.xml><?xml version="1.0" encoding="utf-8"?>
 <ds:datastoreItem xmlns:ds="http://schemas.openxmlformats.org/officeDocument/2006/customXml" ds:itemID="{094A569E-5259-4F26-8F5F-707FFDFDFFD5}">
   <ds:schemaRefs>
     <ds:schemaRef ds:uri="1501a101-02f8-4cb9-8ad4-ac4c2bb50a5e"/>
@@ -39859,7 +40297,7 @@
 </ds:datastoreItem>
 </file>
 
-<file path=customXml/itemProps2.xml><?xml version="1.0" encoding="utf-8"?>
+<file path=customXml/itemProps3.xml><?xml version="1.0" encoding="utf-8"?>
 <ds:datastoreItem xmlns:ds="http://schemas.openxmlformats.org/officeDocument/2006/customXml" ds:itemID="{33987D0E-8AD6-44B0-B42F-EA7CD1B4DB7E}">
   <ds:schemaRefs>
     <ds:schemaRef ds:uri="http://schemas.microsoft.com/office/2006/metadata/contentType"/>
@@ -39876,12 +40314,4 @@
     <ds:schemaRef ds:uri="http://schemas.microsoft.com/internal/obd"/>
   </ds:schemaRefs>
 </ds:datastoreItem>
-</file>
-
-<file path=customXml/itemProps3.xml><?xml version="1.0" encoding="utf-8"?>
-<ds:datastoreItem xmlns:ds="http://schemas.openxmlformats.org/officeDocument/2006/customXml" ds:itemID="{89D6709A-1285-445D-8507-9077DBC04879}">
-  <ds:schemaRefs>
-    <ds:schemaRef ds:uri="http://schemas.microsoft.com/sharepoint/v3/contenttype/forms"/>
-  </ds:schemaRefs>
-</ds:datastoreItem>
 </file>
</xml_diff>